<commit_message>
update realistic face generation slides
</commit_message>
<xml_diff>
--- a/01-topic-selection/topics/generation-of-realistic-faces/slides.pptx
+++ b/01-topic-selection/topics/generation-of-realistic-faces/slides.pptx
@@ -2690,10 +2690,85 @@
           <a:bodyPr/>
           <a:lstStyle/>
           <a:p>
-            <a:r>
-              <a:rPr lang="en-US" dirty="0"/>
-              <a:t>Setting the larger context</a:t>
-            </a:r>
+            <a:pPr>
+              <a:buFont typeface="Arial" panose="020B0604020202020204" pitchFamily="34" charset="0"/>
+              <a:buChar char="•"/>
+            </a:pPr>
+            <a:r>
+              <a:rPr lang="de-DE" dirty="0"/>
+              <a:t>generation of realistic faces ongoing problem</a:t>
+            </a:r>
+          </a:p>
+          <a:p>
+            <a:pPr>
+              <a:buFont typeface="Arial" panose="020B0604020202020204" pitchFamily="34" charset="0"/>
+              <a:buChar char="•"/>
+            </a:pPr>
+            <a:endParaRPr lang="de-DE" dirty="0"/>
+          </a:p>
+          <a:p>
+            <a:pPr>
+              <a:buFont typeface="Arial" panose="020B0604020202020204" pitchFamily="34" charset="0"/>
+              <a:buChar char="•"/>
+            </a:pPr>
+            <a:r>
+              <a:rPr lang="de-DE" dirty="0"/>
+              <a:t>need for better self-presentation</a:t>
+            </a:r>
+          </a:p>
+          <a:p>
+            <a:pPr>
+              <a:buFont typeface="Arial" panose="020B0604020202020204" pitchFamily="34" charset="0"/>
+              <a:buChar char="•"/>
+            </a:pPr>
+            <a:endParaRPr lang="de-DE" dirty="0"/>
+          </a:p>
+          <a:p>
+            <a:pPr>
+              <a:buFont typeface="Arial" panose="020B0604020202020204" pitchFamily="34" charset="0"/>
+              <a:buChar char="•"/>
+            </a:pPr>
+            <a:r>
+              <a:rPr lang="de-DE" dirty="0"/>
+              <a:t>3 approaches for modeling</a:t>
+            </a:r>
+          </a:p>
+          <a:p>
+            <a:pPr lvl="1">
+              <a:buFont typeface="Arial" panose="020B0604020202020204" pitchFamily="34" charset="0"/>
+              <a:buChar char="•"/>
+            </a:pPr>
+            <a:r>
+              <a:rPr lang="de-DE" dirty="0"/>
+              <a:t>parameter model</a:t>
+            </a:r>
+          </a:p>
+          <a:p>
+            <a:pPr lvl="1">
+              <a:buFont typeface="Arial" panose="020B0604020202020204" pitchFamily="34" charset="0"/>
+              <a:buChar char="•"/>
+            </a:pPr>
+            <a:r>
+              <a:rPr lang="de-DE" dirty="0"/>
+              <a:t>physiological muscle model</a:t>
+            </a:r>
+          </a:p>
+          <a:p>
+            <a:pPr lvl="1">
+              <a:buFont typeface="Arial" panose="020B0604020202020204" pitchFamily="34" charset="0"/>
+              <a:buChar char="•"/>
+            </a:pPr>
+            <a:r>
+              <a:rPr lang="de-DE" dirty="0"/>
+              <a:t>visual modeling based on images</a:t>
+            </a:r>
+          </a:p>
+          <a:p>
+            <a:pPr lvl="1">
+              <a:buFont typeface="Arial" panose="020B0604020202020204" pitchFamily="34" charset="0"/>
+              <a:buChar char="•"/>
+            </a:pPr>
+            <a:endParaRPr lang="en-US" dirty="0"/>
           </a:p>
         </p:txBody>
       </p:sp>
@@ -2814,10 +2889,79 @@
           <a:bodyPr/>
           <a:lstStyle/>
           <a:p>
+            <a:pPr>
+              <a:buFont typeface="Arial" panose="020B0604020202020204" pitchFamily="34" charset="0"/>
+              <a:buChar char="•"/>
+            </a:pPr>
+            <a:r>
+              <a:rPr lang="en-US" dirty="0" err="1"/>
+              <a:t>FaceMaker</a:t>
+            </a:r>
             <a:r>
               <a:rPr lang="en-US" dirty="0"/>
-              <a:t>Describe what we learn from previous work you put into the wiki</a:t>
-            </a:r>
+              <a:t>: tool for generating parameterized face models</a:t>
+            </a:r>
+          </a:p>
+          <a:p>
+            <a:pPr>
+              <a:buFont typeface="Arial" panose="020B0604020202020204" pitchFamily="34" charset="0"/>
+              <a:buChar char="•"/>
+            </a:pPr>
+            <a:endParaRPr lang="en-US" dirty="0"/>
+          </a:p>
+          <a:p>
+            <a:pPr>
+              <a:buFont typeface="Arial" panose="020B0604020202020204" pitchFamily="34" charset="0"/>
+              <a:buChar char="•"/>
+            </a:pPr>
+            <a:r>
+              <a:rPr lang="en-US" dirty="0"/>
+              <a:t>Generative Adversarial Networks (GANs)</a:t>
+            </a:r>
+          </a:p>
+          <a:p>
+            <a:pPr lvl="1">
+              <a:buFont typeface="Arial" panose="020B0604020202020204" pitchFamily="34" charset="0"/>
+              <a:buChar char="•"/>
+            </a:pPr>
+            <a:r>
+              <a:rPr lang="en-US" dirty="0"/>
+              <a:t>“Generative” part (Generator): using a label to predict a feature</a:t>
+            </a:r>
+          </a:p>
+          <a:p>
+            <a:pPr lvl="1">
+              <a:buFont typeface="Arial" panose="020B0604020202020204" pitchFamily="34" charset="0"/>
+              <a:buChar char="•"/>
+            </a:pPr>
+            <a:r>
+              <a:rPr lang="en-US" dirty="0"/>
+              <a:t>“Adversarial” part (Discriminator): using a feature to predict a label</a:t>
+            </a:r>
+          </a:p>
+          <a:p>
+            <a:pPr lvl="1">
+              <a:buFont typeface="Arial" panose="020B0604020202020204" pitchFamily="34" charset="0"/>
+              <a:buChar char="•"/>
+            </a:pPr>
+            <a:r>
+              <a:rPr lang="en-US" dirty="0"/>
+              <a:t>both parts are learning and improving through feedback loops</a:t>
+            </a:r>
+          </a:p>
+          <a:p>
+            <a:pPr lvl="1">
+              <a:buFont typeface="Arial" panose="020B0604020202020204" pitchFamily="34" charset="0"/>
+              <a:buChar char="•"/>
+            </a:pPr>
+            <a:endParaRPr lang="en-US" dirty="0"/>
+          </a:p>
+          <a:p>
+            <a:pPr>
+              <a:buFont typeface="Arial" panose="020B0604020202020204" pitchFamily="34" charset="0"/>
+              <a:buChar char="•"/>
+            </a:pPr>
+            <a:endParaRPr lang="en-US" dirty="0"/>
           </a:p>
           <a:p>
             <a:endParaRPr lang="de-DE" dirty="0"/>
@@ -2937,13 +3081,55 @@
           <a:bodyPr/>
           <a:lstStyle/>
           <a:p>
+            <a:pPr>
+              <a:buFont typeface="Arial" panose="020B0604020202020204" pitchFamily="34" charset="0"/>
+              <a:buChar char="•"/>
+            </a:pPr>
+            <a:r>
+              <a:rPr lang="en-US" dirty="0"/>
+              <a:t>generate paired samples: artificial faces and corresponding real face</a:t>
+            </a:r>
+          </a:p>
+          <a:p>
+            <a:pPr>
+              <a:buFont typeface="Arial" panose="020B0604020202020204" pitchFamily="34" charset="0"/>
+              <a:buChar char="•"/>
+            </a:pPr>
+            <a:endParaRPr lang="en-US" dirty="0"/>
+          </a:p>
+          <a:p>
+            <a:pPr>
+              <a:buFont typeface="Arial" panose="020B0604020202020204" pitchFamily="34" charset="0"/>
+              <a:buChar char="•"/>
+            </a:pPr>
+            <a:r>
+              <a:rPr lang="en-US" dirty="0"/>
+              <a:t>use data for tuning and improving GANs’ results</a:t>
+            </a:r>
+          </a:p>
+          <a:p>
+            <a:pPr>
+              <a:buFont typeface="Arial" panose="020B0604020202020204" pitchFamily="34" charset="0"/>
+              <a:buChar char="•"/>
+            </a:pPr>
+            <a:endParaRPr lang="en-US" dirty="0"/>
+          </a:p>
+          <a:p>
+            <a:pPr>
+              <a:buFont typeface="Arial" panose="020B0604020202020204" pitchFamily="34" charset="0"/>
+              <a:buChar char="•"/>
+            </a:pPr>
+            <a:r>
+              <a:rPr lang="en-US" dirty="0"/>
+              <a:t>validate model by comparing generated (</a:t>
+            </a:r>
             <a:r>
               <a:rPr lang="en-US"/>
-              <a:t>What </a:t>
+              <a:t>by participants) </a:t>
             </a:r>
             <a:r>
               <a:rPr lang="en-US" dirty="0"/>
-              <a:t>is the question you want to investigate?</a:t>
+              <a:t>and realistic faces</a:t>
             </a:r>
           </a:p>
           <a:p>

</xml_diff>